<commit_message>
Adicionando aos slides a revisao bibliografica e topicos abordados nos trabalhos correlatos
</commit_message>
<xml_diff>
--- a/pre-projeto/slides.pptx
+++ b/pre-projeto/slides.pptx
@@ -26,6 +26,8 @@
     <p:sldId id="271" r:id="rId20"/>
     <p:sldId id="272" r:id="rId21"/>
     <p:sldId id="273" r:id="rId22"/>
+    <p:sldId id="274" r:id="rId23"/>
+    <p:sldId id="275" r:id="rId24"/>
   </p:sldIdLst>
   <p:sldSz cy="6858000" cx="12192000"/>
   <p:notesSz cx="6858000" cy="9144000"/>
@@ -2800,6 +2802,148 @@
 </p:notes>
 </file>
 
+<file path=ppt/notesSlides/notesSlide19.xml><?xml version="1.0" encoding="utf-8"?>
+<p:notes xmlns:a="http://schemas.openxmlformats.org/drawingml/2006/main" xmlns:r="http://schemas.openxmlformats.org/officeDocument/2006/relationships" xmlns:mc="http://schemas.openxmlformats.org/markup-compatibility/2006" xmlns:mv="urn:schemas-microsoft-com:mac:vml" xmlns:p="http://schemas.openxmlformats.org/presentationml/2006/main" xmlns:c="http://schemas.openxmlformats.org/drawingml/2006/chart" xmlns:dgm="http://schemas.openxmlformats.org/drawingml/2006/diagram" xmlns:o="urn:schemas-microsoft-com:office:office" xmlns:v="urn:schemas-microsoft-com:vml" xmlns:pvml="urn:schemas-microsoft-com:office:powerpoint" xmlns:com="http://schemas.openxmlformats.org/drawingml/2006/compatibility" xmlns:p14="http://schemas.microsoft.com/office/powerpoint/2010/main" xmlns:p15="http://schemas.microsoft.com/office/powerpoint/2012/main" showMasterPhAnim="0" showMasterSp="0">
+  <p:cSld>
+    <p:spTree>
+      <p:nvGrpSpPr>
+        <p:cNvPr id="214" name="Shape 214"/>
+        <p:cNvGrpSpPr/>
+        <p:nvPr/>
+      </p:nvGrpSpPr>
+      <p:grpSpPr>
+        <a:xfrm>
+          <a:off x="0" y="0"/>
+          <a:ext cx="0" cy="0"/>
+          <a:chOff x="0" y="0"/>
+          <a:chExt cx="0" cy="0"/>
+        </a:xfrm>
+      </p:grpSpPr>
+      <p:sp>
+        <p:nvSpPr>
+          <p:cNvPr id="215" name="Shape 215"/>
+          <p:cNvSpPr/>
+          <p:nvPr>
+            <p:ph idx="2" type="sldImg"/>
+          </p:nvPr>
+        </p:nvSpPr>
+        <p:spPr>
+          <a:xfrm>
+            <a:off x="685800" y="1143000"/>
+            <a:ext cx="5486400" cy="3086100"/>
+          </a:xfrm>
+          <a:custGeom>
+            <a:pathLst>
+              <a:path extrusionOk="0" h="120000" w="120000">
+                <a:moveTo>
+                  <a:pt x="0" y="0"/>
+                </a:moveTo>
+                <a:lnTo>
+                  <a:pt x="120000" y="0"/>
+                </a:lnTo>
+                <a:lnTo>
+                  <a:pt x="120000" y="120000"/>
+                </a:lnTo>
+                <a:lnTo>
+                  <a:pt x="0" y="120000"/>
+                </a:lnTo>
+                <a:close/>
+              </a:path>
+            </a:pathLst>
+          </a:custGeom>
+        </p:spPr>
+      </p:sp>
+      <p:sp>
+        <p:nvSpPr>
+          <p:cNvPr id="216" name="Shape 216"/>
+          <p:cNvSpPr txBox="1"/>
+          <p:nvPr>
+            <p:ph idx="1" type="body"/>
+          </p:nvPr>
+        </p:nvSpPr>
+        <p:spPr>
+          <a:xfrm>
+            <a:off x="685800" y="4400550"/>
+            <a:ext cx="5486400" cy="3600600"/>
+          </a:xfrm>
+          <a:prstGeom prst="rect">
+            <a:avLst/>
+          </a:prstGeom>
+        </p:spPr>
+        <p:txBody>
+          <a:bodyPr anchorCtr="0" anchor="t" bIns="91425" lIns="91425" spcFirstLastPara="1" rIns="91425" wrap="square" tIns="91425">
+            <a:noAutofit/>
+          </a:bodyPr>
+          <a:lstStyle/>
+          <a:p>
+            <a:pPr indent="0" lvl="0" marL="0" rtl="0">
+              <a:spcBef>
+                <a:spcPts val="0"/>
+              </a:spcBef>
+              <a:spcAft>
+                <a:spcPts val="0"/>
+              </a:spcAft>
+              <a:buNone/>
+            </a:pPr>
+            <a:r>
+              <a:t/>
+            </a:r>
+            <a:endParaRPr/>
+          </a:p>
+        </p:txBody>
+      </p:sp>
+      <p:sp>
+        <p:nvSpPr>
+          <p:cNvPr id="217" name="Shape 217"/>
+          <p:cNvSpPr txBox="1"/>
+          <p:nvPr>
+            <p:ph idx="12" type="sldNum"/>
+          </p:nvPr>
+        </p:nvSpPr>
+        <p:spPr>
+          <a:xfrm>
+            <a:off x="3884613" y="8685213"/>
+            <a:ext cx="2971800" cy="458700"/>
+          </a:xfrm>
+          <a:prstGeom prst="rect">
+            <a:avLst/>
+          </a:prstGeom>
+        </p:spPr>
+        <p:txBody>
+          <a:bodyPr anchorCtr="0" anchor="b" bIns="45700" lIns="91425" spcFirstLastPara="1" rIns="91425" wrap="square" tIns="45700">
+            <a:noAutofit/>
+          </a:bodyPr>
+          <a:lstStyle/>
+          <a:p>
+            <a:pPr indent="0" lvl="0" marL="0" rtl="0">
+              <a:spcBef>
+                <a:spcPts val="0"/>
+              </a:spcBef>
+              <a:spcAft>
+                <a:spcPts val="0"/>
+              </a:spcAft>
+              <a:buClr>
+                <a:srgbClr val="000000"/>
+              </a:buClr>
+              <a:buFont typeface="Arial"/>
+              <a:buNone/>
+            </a:pPr>
+            <a:fld id="{00000000-1234-1234-1234-123412341234}" type="slidenum">
+              <a:rPr lang="en-US"/>
+              <a:t>‹#›</a:t>
+            </a:fld>
+            <a:endParaRPr/>
+          </a:p>
+        </p:txBody>
+      </p:sp>
+    </p:spTree>
+  </p:cSld>
+  <p:clrMapOvr>
+    <a:masterClrMapping/>
+  </p:clrMapOvr>
+</p:notes>
+</file>
+
 <file path=ppt/notesSlides/notesSlide2.xml><?xml version="1.0" encoding="utf-8"?>
 <p:notes xmlns:a="http://schemas.openxmlformats.org/drawingml/2006/main" xmlns:r="http://schemas.openxmlformats.org/officeDocument/2006/relationships" xmlns:mc="http://schemas.openxmlformats.org/markup-compatibility/2006" xmlns:mv="urn:schemas-microsoft-com:mac:vml" xmlns:p="http://schemas.openxmlformats.org/presentationml/2006/main" xmlns:c="http://schemas.openxmlformats.org/drawingml/2006/chart" xmlns:dgm="http://schemas.openxmlformats.org/drawingml/2006/diagram" xmlns:o="urn:schemas-microsoft-com:office:office" xmlns:v="urn:schemas-microsoft-com:vml" xmlns:pvml="urn:schemas-microsoft-com:office:powerpoint" xmlns:com="http://schemas.openxmlformats.org/drawingml/2006/compatibility" xmlns:p14="http://schemas.microsoft.com/office/powerpoint/2010/main" xmlns:p15="http://schemas.microsoft.com/office/powerpoint/2012/main" showMasterPhAnim="0" showMasterSp="0">
   <p:cSld>
@@ -2893,6 +3037,148 @@
             </a:pathLst>
           </a:custGeom>
         </p:spPr>
+      </p:sp>
+    </p:spTree>
+  </p:cSld>
+  <p:clrMapOvr>
+    <a:masterClrMapping/>
+  </p:clrMapOvr>
+</p:notes>
+</file>
+
+<file path=ppt/notesSlides/notesSlide20.xml><?xml version="1.0" encoding="utf-8"?>
+<p:notes xmlns:a="http://schemas.openxmlformats.org/drawingml/2006/main" xmlns:r="http://schemas.openxmlformats.org/officeDocument/2006/relationships" xmlns:mc="http://schemas.openxmlformats.org/markup-compatibility/2006" xmlns:mv="urn:schemas-microsoft-com:mac:vml" xmlns:p="http://schemas.openxmlformats.org/presentationml/2006/main" xmlns:c="http://schemas.openxmlformats.org/drawingml/2006/chart" xmlns:dgm="http://schemas.openxmlformats.org/drawingml/2006/diagram" xmlns:o="urn:schemas-microsoft-com:office:office" xmlns:v="urn:schemas-microsoft-com:vml" xmlns:pvml="urn:schemas-microsoft-com:office:powerpoint" xmlns:com="http://schemas.openxmlformats.org/drawingml/2006/compatibility" xmlns:p14="http://schemas.microsoft.com/office/powerpoint/2010/main" xmlns:p15="http://schemas.microsoft.com/office/powerpoint/2012/main" showMasterPhAnim="0" showMasterSp="0">
+  <p:cSld>
+    <p:spTree>
+      <p:nvGrpSpPr>
+        <p:cNvPr id="221" name="Shape 221"/>
+        <p:cNvGrpSpPr/>
+        <p:nvPr/>
+      </p:nvGrpSpPr>
+      <p:grpSpPr>
+        <a:xfrm>
+          <a:off x="0" y="0"/>
+          <a:ext cx="0" cy="0"/>
+          <a:chOff x="0" y="0"/>
+          <a:chExt cx="0" cy="0"/>
+        </a:xfrm>
+      </p:grpSpPr>
+      <p:sp>
+        <p:nvSpPr>
+          <p:cNvPr id="222" name="Shape 222"/>
+          <p:cNvSpPr/>
+          <p:nvPr>
+            <p:ph idx="2" type="sldImg"/>
+          </p:nvPr>
+        </p:nvSpPr>
+        <p:spPr>
+          <a:xfrm>
+            <a:off x="685800" y="1143000"/>
+            <a:ext cx="5486400" cy="3086100"/>
+          </a:xfrm>
+          <a:custGeom>
+            <a:pathLst>
+              <a:path extrusionOk="0" h="120000" w="120000">
+                <a:moveTo>
+                  <a:pt x="0" y="0"/>
+                </a:moveTo>
+                <a:lnTo>
+                  <a:pt x="120000" y="0"/>
+                </a:lnTo>
+                <a:lnTo>
+                  <a:pt x="120000" y="120000"/>
+                </a:lnTo>
+                <a:lnTo>
+                  <a:pt x="0" y="120000"/>
+                </a:lnTo>
+                <a:close/>
+              </a:path>
+            </a:pathLst>
+          </a:custGeom>
+        </p:spPr>
+      </p:sp>
+      <p:sp>
+        <p:nvSpPr>
+          <p:cNvPr id="223" name="Shape 223"/>
+          <p:cNvSpPr txBox="1"/>
+          <p:nvPr>
+            <p:ph idx="1" type="body"/>
+          </p:nvPr>
+        </p:nvSpPr>
+        <p:spPr>
+          <a:xfrm>
+            <a:off x="685800" y="4400550"/>
+            <a:ext cx="5486400" cy="3600600"/>
+          </a:xfrm>
+          <a:prstGeom prst="rect">
+            <a:avLst/>
+          </a:prstGeom>
+        </p:spPr>
+        <p:txBody>
+          <a:bodyPr anchorCtr="0" anchor="t" bIns="91425" lIns="91425" spcFirstLastPara="1" rIns="91425" wrap="square" tIns="91425">
+            <a:noAutofit/>
+          </a:bodyPr>
+          <a:lstStyle/>
+          <a:p>
+            <a:pPr indent="0" lvl="0" marL="0" rtl="0">
+              <a:spcBef>
+                <a:spcPts val="0"/>
+              </a:spcBef>
+              <a:spcAft>
+                <a:spcPts val="0"/>
+              </a:spcAft>
+              <a:buNone/>
+            </a:pPr>
+            <a:r>
+              <a:t/>
+            </a:r>
+            <a:endParaRPr/>
+          </a:p>
+        </p:txBody>
+      </p:sp>
+      <p:sp>
+        <p:nvSpPr>
+          <p:cNvPr id="224" name="Shape 224"/>
+          <p:cNvSpPr txBox="1"/>
+          <p:nvPr>
+            <p:ph idx="12" type="sldNum"/>
+          </p:nvPr>
+        </p:nvSpPr>
+        <p:spPr>
+          <a:xfrm>
+            <a:off x="3884613" y="8685213"/>
+            <a:ext cx="2971800" cy="458700"/>
+          </a:xfrm>
+          <a:prstGeom prst="rect">
+            <a:avLst/>
+          </a:prstGeom>
+        </p:spPr>
+        <p:txBody>
+          <a:bodyPr anchorCtr="0" anchor="b" bIns="45700" lIns="91425" spcFirstLastPara="1" rIns="91425" wrap="square" tIns="45700">
+            <a:noAutofit/>
+          </a:bodyPr>
+          <a:lstStyle/>
+          <a:p>
+            <a:pPr indent="0" lvl="0" marL="0" rtl="0">
+              <a:spcBef>
+                <a:spcPts val="0"/>
+              </a:spcBef>
+              <a:spcAft>
+                <a:spcPts val="0"/>
+              </a:spcAft>
+              <a:buClr>
+                <a:srgbClr val="000000"/>
+              </a:buClr>
+              <a:buFont typeface="Arial"/>
+              <a:buNone/>
+            </a:pPr>
+            <a:fld id="{00000000-1234-1234-1234-123412341234}" type="slidenum">
+              <a:rPr lang="en-US"/>
+              <a:t>‹#›</a:t>
+            </a:fld>
+            <a:endParaRPr/>
+          </a:p>
+        </p:txBody>
       </p:sp>
     </p:spTree>
   </p:cSld>
@@ -18054,6 +18340,89 @@
             </a:r>
             <a:endParaRPr/>
           </a:p>
+          <a:p>
+            <a:pPr indent="0" lvl="0" marL="0" rtl="0">
+              <a:spcBef>
+                <a:spcPts val="1000"/>
+              </a:spcBef>
+              <a:spcAft>
+                <a:spcPts val="0"/>
+              </a:spcAft>
+              <a:buNone/>
+            </a:pPr>
+            <a:r>
+              <a:t/>
+            </a:r>
+            <a:endParaRPr/>
+          </a:p>
+          <a:p>
+            <a:pPr indent="-406400" lvl="0" marL="457200" rtl="0">
+              <a:spcBef>
+                <a:spcPts val="1000"/>
+              </a:spcBef>
+              <a:spcAft>
+                <a:spcPts val="0"/>
+              </a:spcAft>
+              <a:buSzPts val="2800"/>
+              <a:buChar char="-"/>
+            </a:pPr>
+            <a:r>
+              <a:rPr lang="en-US"/>
+              <a:t>Aborda aplicação WEB</a:t>
+            </a:r>
+            <a:endParaRPr/>
+          </a:p>
+          <a:p>
+            <a:pPr indent="-406400" lvl="0" marL="457200" rtl="0">
+              <a:spcBef>
+                <a:spcPts val="0"/>
+              </a:spcBef>
+              <a:spcAft>
+                <a:spcPts val="0"/>
+              </a:spcAft>
+              <a:buSzPts val="2800"/>
+              <a:buChar char="-"/>
+            </a:pPr>
+            <a:r>
+              <a:rPr lang="en-US"/>
+              <a:t>Aborda interface móvel</a:t>
+            </a:r>
+            <a:endParaRPr/>
+          </a:p>
+          <a:p>
+            <a:pPr indent="-406400" lvl="0" marL="457200" rtl="0">
+              <a:spcBef>
+                <a:spcPts val="0"/>
+              </a:spcBef>
+              <a:spcAft>
+                <a:spcPts val="0"/>
+              </a:spcAft>
+              <a:buSzPts val="2800"/>
+              <a:buChar char="-"/>
+            </a:pPr>
+            <a:r>
+              <a:rPr lang="en-US"/>
+              <a:t>Aborda definição do controle de fluxos</a:t>
+            </a:r>
+            <a:endParaRPr/>
+          </a:p>
+          <a:p>
+            <a:pPr indent="-406400" lvl="0" marL="457200">
+              <a:spcBef>
+                <a:spcPts val="0"/>
+              </a:spcBef>
+              <a:spcAft>
+                <a:spcPts val="0"/>
+              </a:spcAft>
+              <a:buSzPts val="2800"/>
+              <a:buChar char="-"/>
+            </a:pPr>
+            <a:r>
+              <a:rPr lang="en-US"/>
+              <a:t>Aborda definição do controle de dispositivos</a:t>
+            </a:r>
+            <a:endParaRPr/>
+          </a:p>
         </p:txBody>
       </p:sp>
     </p:spTree>
@@ -18163,7 +18532,73 @@
             </a:r>
             <a:r>
               <a:rPr lang="en-US"/>
-              <a:t>, 2017. Disponível em: . Acesso em 01 de abr. 2018. </a:t>
+              <a:t>, 2017. Disponível em: . Acesso em 01 de abr. 2018.</a:t>
+            </a:r>
+            <a:endParaRPr/>
+          </a:p>
+          <a:p>
+            <a:pPr indent="0" lvl="0" marL="0">
+              <a:spcBef>
+                <a:spcPts val="1000"/>
+              </a:spcBef>
+              <a:spcAft>
+                <a:spcPts val="0"/>
+              </a:spcAft>
+              <a:buNone/>
+            </a:pPr>
+            <a:r>
+              <a:t/>
+            </a:r>
+            <a:endParaRPr/>
+          </a:p>
+          <a:p>
+            <a:pPr indent="-406400" lvl="0" marL="457200" rtl="0">
+              <a:spcBef>
+                <a:spcPts val="1000"/>
+              </a:spcBef>
+              <a:spcAft>
+                <a:spcPts val="0"/>
+              </a:spcAft>
+              <a:buSzPts val="2800"/>
+              <a:buChar char="-"/>
+            </a:pPr>
+            <a:r>
+              <a:rPr lang="en-US"/>
+              <a:t>Aborda utilização do Protocolo REST </a:t>
+            </a:r>
+            <a:endParaRPr/>
+          </a:p>
+          <a:p>
+            <a:pPr indent="-406400" lvl="0" marL="457200" rtl="0">
+              <a:spcBef>
+                <a:spcPts val="0"/>
+              </a:spcBef>
+              <a:spcAft>
+                <a:spcPts val="0"/>
+              </a:spcAft>
+              <a:buSzPts val="2800"/>
+              <a:buChar char="-"/>
+            </a:pPr>
+            <a:r>
+              <a:rPr lang="en-US"/>
+              <a:t>Aborda utilização do Protocolo AMQP </a:t>
+            </a:r>
+            <a:endParaRPr/>
+          </a:p>
+          <a:p>
+            <a:pPr indent="-406400" lvl="0" marL="457200">
+              <a:spcBef>
+                <a:spcPts val="0"/>
+              </a:spcBef>
+              <a:spcAft>
+                <a:spcPts val="0"/>
+              </a:spcAft>
+              <a:buSzPts val="2800"/>
+              <a:buChar char="-"/>
+            </a:pPr>
+            <a:r>
+              <a:rPr lang="en-US"/>
+              <a:t>Aborda utilização do Protocolo MQTT </a:t>
             </a:r>
             <a:endParaRPr/>
           </a:p>
@@ -18277,6 +18712,72 @@
             <a:r>
               <a:rPr lang="en-US"/>
               <a:t>​, Disponível em: . Acesso em 01 de abr. 2018. </a:t>
+            </a:r>
+            <a:endParaRPr/>
+          </a:p>
+          <a:p>
+            <a:pPr indent="0" lvl="0" marL="0">
+              <a:spcBef>
+                <a:spcPts val="1000"/>
+              </a:spcBef>
+              <a:spcAft>
+                <a:spcPts val="0"/>
+              </a:spcAft>
+              <a:buNone/>
+            </a:pPr>
+            <a:r>
+              <a:t/>
+            </a:r>
+            <a:endParaRPr/>
+          </a:p>
+          <a:p>
+            <a:pPr indent="-406400" lvl="0" marL="457200" rtl="0">
+              <a:spcBef>
+                <a:spcPts val="1000"/>
+              </a:spcBef>
+              <a:spcAft>
+                <a:spcPts val="0"/>
+              </a:spcAft>
+              <a:buSzPts val="2800"/>
+              <a:buChar char="-"/>
+            </a:pPr>
+            <a:r>
+              <a:rPr lang="en-US"/>
+              <a:t>Aborda aplicação WEB </a:t>
+            </a:r>
+            <a:endParaRPr/>
+          </a:p>
+          <a:p>
+            <a:pPr indent="-406400" lvl="0" marL="457200" rtl="0">
+              <a:spcBef>
+                <a:spcPts val="0"/>
+              </a:spcBef>
+              <a:spcAft>
+                <a:spcPts val="0"/>
+              </a:spcAft>
+              <a:buSzPts val="2800"/>
+              <a:buChar char="-"/>
+            </a:pPr>
+            <a:r>
+              <a:rPr lang="en-US"/>
+              <a:t>Aborda interface móvel </a:t>
+            </a:r>
+            <a:endParaRPr/>
+          </a:p>
+          <a:p>
+            <a:pPr indent="-406400" lvl="0" marL="457200">
+              <a:spcBef>
+                <a:spcPts val="0"/>
+              </a:spcBef>
+              <a:spcAft>
+                <a:spcPts val="0"/>
+              </a:spcAft>
+              <a:buSzPts val="2800"/>
+              <a:buChar char="-"/>
+            </a:pPr>
+            <a:r>
+              <a:rPr lang="en-US"/>
+              <a:t>Aborda multiplataforma</a:t>
             </a:r>
             <a:endParaRPr/>
           </a:p>
@@ -18891,7 +19392,11 @@
             </a:pPr>
             <a:r>
               <a:rPr lang="en-US"/>
-              <a:t>Referências: Precisa?</a:t>
+              <a:t>Revisão </a:t>
+            </a:r>
+            <a:r>
+              <a:rPr lang="en-US"/>
+              <a:t>Bibliográfica</a:t>
             </a:r>
             <a:endParaRPr/>
           </a:p>
@@ -18920,7 +19425,145 @@
           </a:bodyPr>
           <a:lstStyle/>
           <a:p>
+            <a:pPr indent="-406400" lvl="0" marL="457200" rtl="0">
+              <a:spcBef>
+                <a:spcPts val="1000"/>
+              </a:spcBef>
+              <a:spcAft>
+                <a:spcPts val="0"/>
+              </a:spcAft>
+              <a:buSzPts val="2800"/>
+              <a:buChar char="-"/>
+            </a:pPr>
+            <a:r>
+              <a:rPr lang="en-US"/>
+              <a:t>Souza (2016, p. 13) “A principal característica deste conceito é a presença de um conjunto de objetos, sensores e dispositivos eletrônicos [..] que são capazes de interagir entre si, a partir de uma rede [...]”.</a:t>
+            </a:r>
+            <a:endParaRPr/>
+          </a:p>
+          <a:p>
             <a:pPr indent="0" lvl="0" marL="0">
+              <a:spcBef>
+                <a:spcPts val="1000"/>
+              </a:spcBef>
+              <a:spcAft>
+                <a:spcPts val="0"/>
+              </a:spcAft>
+              <a:buNone/>
+            </a:pPr>
+            <a:r>
+              <a:t/>
+            </a:r>
+            <a:endParaRPr/>
+          </a:p>
+        </p:txBody>
+      </p:sp>
+    </p:spTree>
+  </p:cSld>
+  <p:clrMapOvr>
+    <a:masterClrMapping/>
+  </p:clrMapOvr>
+</p:sld>
+</file>
+
+<file path=ppt/slides/slide19.xml><?xml version="1.0" encoding="utf-8"?>
+<p:sld xmlns:a="http://schemas.openxmlformats.org/drawingml/2006/main" xmlns:r="http://schemas.openxmlformats.org/officeDocument/2006/relationships" xmlns:mc="http://schemas.openxmlformats.org/markup-compatibility/2006" xmlns:mv="urn:schemas-microsoft-com:mac:vml" xmlns:p="http://schemas.openxmlformats.org/presentationml/2006/main" xmlns:c="http://schemas.openxmlformats.org/drawingml/2006/chart" xmlns:dgm="http://schemas.openxmlformats.org/drawingml/2006/diagram" xmlns:o="urn:schemas-microsoft-com:office:office" xmlns:v="urn:schemas-microsoft-com:vml" xmlns:pvml="urn:schemas-microsoft-com:office:powerpoint" xmlns:com="http://schemas.openxmlformats.org/drawingml/2006/compatibility" xmlns:p14="http://schemas.microsoft.com/office/powerpoint/2010/main" xmlns:p15="http://schemas.microsoft.com/office/powerpoint/2012/main">
+  <p:cSld>
+    <p:spTree>
+      <p:nvGrpSpPr>
+        <p:cNvPr id="218" name="Shape 218"/>
+        <p:cNvGrpSpPr/>
+        <p:nvPr/>
+      </p:nvGrpSpPr>
+      <p:grpSpPr>
+        <a:xfrm>
+          <a:off x="0" y="0"/>
+          <a:ext cx="0" cy="0"/>
+          <a:chOff x="0" y="0"/>
+          <a:chExt cx="0" cy="0"/>
+        </a:xfrm>
+      </p:grpSpPr>
+      <p:sp>
+        <p:nvSpPr>
+          <p:cNvPr id="219" name="Shape 219"/>
+          <p:cNvSpPr txBox="1"/>
+          <p:nvPr>
+            <p:ph type="title"/>
+          </p:nvPr>
+        </p:nvSpPr>
+        <p:spPr>
+          <a:xfrm>
+            <a:off x="838200" y="365125"/>
+            <a:ext cx="10515600" cy="1325700"/>
+          </a:xfrm>
+          <a:prstGeom prst="rect">
+            <a:avLst/>
+          </a:prstGeom>
+        </p:spPr>
+        <p:txBody>
+          <a:bodyPr anchorCtr="0" anchor="ctr" bIns="91425" lIns="91425" spcFirstLastPara="1" rIns="91425" wrap="square" tIns="91425">
+            <a:noAutofit/>
+          </a:bodyPr>
+          <a:lstStyle/>
+          <a:p>
+            <a:pPr indent="0" lvl="0" marL="0" rtl="0">
+              <a:spcBef>
+                <a:spcPts val="0"/>
+              </a:spcBef>
+              <a:spcAft>
+                <a:spcPts val="0"/>
+              </a:spcAft>
+              <a:buNone/>
+            </a:pPr>
+            <a:r>
+              <a:rPr lang="en-US"/>
+              <a:t>Revisão Bibliográfica</a:t>
+            </a:r>
+            <a:endParaRPr/>
+          </a:p>
+        </p:txBody>
+      </p:sp>
+      <p:sp>
+        <p:nvSpPr>
+          <p:cNvPr id="220" name="Shape 220"/>
+          <p:cNvSpPr txBox="1"/>
+          <p:nvPr>
+            <p:ph idx="1" type="body"/>
+          </p:nvPr>
+        </p:nvSpPr>
+        <p:spPr>
+          <a:xfrm>
+            <a:off x="838200" y="1825625"/>
+            <a:ext cx="10515600" cy="4351200"/>
+          </a:xfrm>
+          <a:prstGeom prst="rect">
+            <a:avLst/>
+          </a:prstGeom>
+        </p:spPr>
+        <p:txBody>
+          <a:bodyPr anchorCtr="0" anchor="t" bIns="91425" lIns="91425" spcFirstLastPara="1" rIns="91425" wrap="square" tIns="91425">
+            <a:noAutofit/>
+          </a:bodyPr>
+          <a:lstStyle/>
+          <a:p>
+            <a:pPr indent="-406400" lvl="0" marL="457200" rtl="0">
+              <a:spcBef>
+                <a:spcPts val="1000"/>
+              </a:spcBef>
+              <a:spcAft>
+                <a:spcPts val="0"/>
+              </a:spcAft>
+              <a:buSzPts val="2800"/>
+              <a:buChar char="-"/>
+            </a:pPr>
+            <a:r>
+              <a:rPr lang="en-US"/>
+              <a:t> Fransson e Driaguine (2017, p. 5, tradução nossa) “Uma aplicação PWA é uma aplicação web, qual é incrementada com algumas tecnologias que permitem um comportamento similar a uma aplicação nativa em dispositivos móveis, enquanto mantém também seu funcionamento em um navegador“.</a:t>
+            </a:r>
+            <a:endParaRPr/>
+          </a:p>
+          <a:p>
+            <a:pPr indent="0" lvl="0" marL="0" rtl="0">
               <a:spcBef>
                 <a:spcPts val="1000"/>
               </a:spcBef>
@@ -19236,6 +19879,143 @@
             <a:r>
               <a:rPr lang="en-US"/>
               <a:t>Bibliografia; Tecnologia; Requisitos; UML; Desenvolvimento;</a:t>
+            </a:r>
+            <a:endParaRPr/>
+          </a:p>
+        </p:txBody>
+      </p:sp>
+    </p:spTree>
+  </p:cSld>
+  <p:clrMapOvr>
+    <a:masterClrMapping/>
+  </p:clrMapOvr>
+</p:sld>
+</file>
+
+<file path=ppt/slides/slide20.xml><?xml version="1.0" encoding="utf-8"?>
+<p:sld xmlns:a="http://schemas.openxmlformats.org/drawingml/2006/main" xmlns:r="http://schemas.openxmlformats.org/officeDocument/2006/relationships" xmlns:mc="http://schemas.openxmlformats.org/markup-compatibility/2006" xmlns:mv="urn:schemas-microsoft-com:mac:vml" xmlns:p="http://schemas.openxmlformats.org/presentationml/2006/main" xmlns:c="http://schemas.openxmlformats.org/drawingml/2006/chart" xmlns:dgm="http://schemas.openxmlformats.org/drawingml/2006/diagram" xmlns:o="urn:schemas-microsoft-com:office:office" xmlns:v="urn:schemas-microsoft-com:vml" xmlns:pvml="urn:schemas-microsoft-com:office:powerpoint" xmlns:com="http://schemas.openxmlformats.org/drawingml/2006/compatibility" xmlns:p14="http://schemas.microsoft.com/office/powerpoint/2010/main" xmlns:p15="http://schemas.microsoft.com/office/powerpoint/2012/main">
+  <p:cSld>
+    <p:spTree>
+      <p:nvGrpSpPr>
+        <p:cNvPr id="225" name="Shape 225"/>
+        <p:cNvGrpSpPr/>
+        <p:nvPr/>
+      </p:nvGrpSpPr>
+      <p:grpSpPr>
+        <a:xfrm>
+          <a:off x="0" y="0"/>
+          <a:ext cx="0" cy="0"/>
+          <a:chOff x="0" y="0"/>
+          <a:chExt cx="0" cy="0"/>
+        </a:xfrm>
+      </p:grpSpPr>
+      <p:sp>
+        <p:nvSpPr>
+          <p:cNvPr id="226" name="Shape 226"/>
+          <p:cNvSpPr txBox="1"/>
+          <p:nvPr>
+            <p:ph type="title"/>
+          </p:nvPr>
+        </p:nvSpPr>
+        <p:spPr>
+          <a:xfrm>
+            <a:off x="838200" y="365125"/>
+            <a:ext cx="10515600" cy="1325700"/>
+          </a:xfrm>
+          <a:prstGeom prst="rect">
+            <a:avLst/>
+          </a:prstGeom>
+        </p:spPr>
+        <p:txBody>
+          <a:bodyPr anchorCtr="0" anchor="ctr" bIns="91425" lIns="91425" spcFirstLastPara="1" rIns="91425" wrap="square" tIns="91425">
+            <a:noAutofit/>
+          </a:bodyPr>
+          <a:lstStyle/>
+          <a:p>
+            <a:pPr indent="0" lvl="0" marL="0" rtl="0">
+              <a:spcBef>
+                <a:spcPts val="0"/>
+              </a:spcBef>
+              <a:spcAft>
+                <a:spcPts val="0"/>
+              </a:spcAft>
+              <a:buNone/>
+            </a:pPr>
+            <a:r>
+              <a:rPr lang="en-US"/>
+              <a:t>Revisão Bibliográfica</a:t>
+            </a:r>
+            <a:endParaRPr/>
+          </a:p>
+        </p:txBody>
+      </p:sp>
+      <p:sp>
+        <p:nvSpPr>
+          <p:cNvPr id="227" name="Shape 227"/>
+          <p:cNvSpPr txBox="1"/>
+          <p:nvPr>
+            <p:ph idx="1" type="body"/>
+          </p:nvPr>
+        </p:nvSpPr>
+        <p:spPr>
+          <a:xfrm>
+            <a:off x="838200" y="1825625"/>
+            <a:ext cx="10515600" cy="4351200"/>
+          </a:xfrm>
+          <a:prstGeom prst="rect">
+            <a:avLst/>
+          </a:prstGeom>
+        </p:spPr>
+        <p:txBody>
+          <a:bodyPr anchorCtr="0" anchor="t" bIns="91425" lIns="91425" spcFirstLastPara="1" rIns="91425" wrap="square" tIns="91425">
+            <a:noAutofit/>
+          </a:bodyPr>
+          <a:lstStyle/>
+          <a:p>
+            <a:pPr indent="-406400" lvl="0" marL="457200" rtl="0">
+              <a:spcBef>
+                <a:spcPts val="1000"/>
+              </a:spcBef>
+              <a:spcAft>
+                <a:spcPts val="0"/>
+              </a:spcAft>
+              <a:buSzPts val="2800"/>
+              <a:buChar char="-"/>
+            </a:pPr>
+            <a:r>
+              <a:rPr lang="en-US"/>
+              <a:t> </a:t>
+            </a:r>
+            <a:r>
+              <a:rPr lang="en-US"/>
+              <a:t>Carmona</a:t>
+            </a:r>
+            <a:r>
+              <a:rPr lang="en-US"/>
+              <a:t> (2017, p. 5) “</a:t>
+            </a:r>
+            <a:r>
+              <a:rPr lang="en-US"/>
+              <a:t>O escopo do software livre usualmente é associado ao intenso desenvolvimento tecnológico que as últimas décadas trouxeram, especialmente na área denominada tecnologia da informação </a:t>
+            </a:r>
+            <a:r>
+              <a:rPr lang="en-US"/>
+              <a:t>“.</a:t>
+            </a:r>
+            <a:endParaRPr/>
+          </a:p>
+          <a:p>
+            <a:pPr indent="0" lvl="0" marL="0" rtl="0">
+              <a:spcBef>
+                <a:spcPts val="1000"/>
+              </a:spcBef>
+              <a:spcAft>
+                <a:spcPts val="0"/>
+              </a:spcAft>
+              <a:buNone/>
+            </a:pPr>
+            <a:r>
+              <a:t/>
             </a:r>
             <a:endParaRPr/>
           </a:p>

</xml_diff>